<commit_message>
Switched to JMS/activemq, refactored into library and made app run more OOB
</commit_message>
<xml_diff>
--- a/data-repair-center-presentation.pptx
+++ b/data-repair-center-presentation.pptx
@@ -20,6 +20,7 @@
     <p:sldId id="270" r:id="rId14"/>
     <p:sldId id="271" r:id="rId15"/>
     <p:sldId id="272" r:id="rId16"/>
+    <p:sldId id="273" r:id="rId17"/>
   </p:sldIdLst>
   <p:sldSz cx="9144000" cy="6858000" type="screen4x3"/>
   <p:notesSz cx="6858000" cy="9144000"/>
@@ -4125,15 +4126,7 @@
             </a:r>
             <a:r>
               <a:rPr lang="en-US" dirty="0" smtClean="0"/>
-              <a:t> 2.0 </a:t>
-            </a:r>
-            <a:r>
-              <a:rPr lang="en-US" smtClean="0"/>
-              <a:t>web UI components </a:t>
-            </a:r>
-            <a:r>
-              <a:rPr lang="en-US" dirty="0" smtClean="0"/>
-              <a:t>will be available through NPM in addition to maven.</a:t>
+              <a:t> 2.0 web UI components will be available through NPM in addition to maven.</a:t>
             </a:r>
             <a:endParaRPr lang="en-US" dirty="0"/>
           </a:p>
@@ -4244,7 +4237,7 @@
         </p:blipFill>
         <p:spPr>
           <a:xfrm>
-            <a:off x="6316432" y="4809403"/>
+            <a:off x="6321590" y="3632746"/>
             <a:ext cx="578942" cy="578942"/>
           </a:xfrm>
           <a:prstGeom prst="rect">
@@ -4304,6 +4297,7 @@
           <a:bodyPr/>
           <a:lstStyle/>
           <a:p>
+            <a:pPr algn="ctr"/>
             <a:r>
               <a:rPr lang="en-US" dirty="0" smtClean="0"/>
               <a:t>Licensing</a:t>
@@ -4341,6 +4335,146 @@
     <p:extLst>
       <p:ext uri="{BB962C8B-B14F-4D97-AF65-F5344CB8AC3E}">
         <p14:creationId xmlns:p14="http://schemas.microsoft.com/office/powerpoint/2010/main" val="686885313"/>
+      </p:ext>
+    </p:extLst>
+  </p:cSld>
+  <p:clrMapOvr>
+    <a:masterClrMapping/>
+  </p:clrMapOvr>
+  <p:timing>
+    <p:tnLst>
+      <p:par>
+        <p:cTn xmlns:p14="http://schemas.microsoft.com/office/powerpoint/2010/main" id="1" dur="indefinite" restart="never" nodeType="tmRoot"/>
+      </p:par>
+    </p:tnLst>
+  </p:timing>
+</p:sld>
+</file>
+
+<file path=ppt/slides/slide16.xml><?xml version="1.0" encoding="utf-8"?>
+<p:sld xmlns:a="http://schemas.openxmlformats.org/drawingml/2006/main" xmlns:r="http://schemas.openxmlformats.org/officeDocument/2006/relationships" xmlns:p="http://schemas.openxmlformats.org/presentationml/2006/main">
+  <p:cSld>
+    <p:spTree>
+      <p:nvGrpSpPr>
+        <p:cNvPr id="1" name=""/>
+        <p:cNvGrpSpPr/>
+        <p:nvPr/>
+      </p:nvGrpSpPr>
+      <p:grpSpPr>
+        <a:xfrm>
+          <a:off x="0" y="0"/>
+          <a:ext cx="0" cy="0"/>
+          <a:chOff x="0" y="0"/>
+          <a:chExt cx="0" cy="0"/>
+        </a:xfrm>
+      </p:grpSpPr>
+      <p:sp>
+        <p:nvSpPr>
+          <p:cNvPr id="2" name="Title 1"/>
+          <p:cNvSpPr>
+            <a:spLocks noGrp="1"/>
+          </p:cNvSpPr>
+          <p:nvPr>
+            <p:ph type="title"/>
+          </p:nvPr>
+        </p:nvSpPr>
+        <p:spPr/>
+        <p:txBody>
+          <a:bodyPr/>
+          <a:lstStyle/>
+          <a:p>
+            <a:pPr algn="ctr"/>
+            <a:r>
+              <a:rPr lang="en-US" dirty="0" smtClean="0"/>
+              <a:t>Thank you !</a:t>
+            </a:r>
+            <a:endParaRPr lang="en-US" dirty="0"/>
+          </a:p>
+        </p:txBody>
+      </p:sp>
+      <p:sp>
+        <p:nvSpPr>
+          <p:cNvPr id="3" name="Content Placeholder 2"/>
+          <p:cNvSpPr>
+            <a:spLocks noGrp="1"/>
+          </p:cNvSpPr>
+          <p:nvPr>
+            <p:ph idx="1"/>
+          </p:nvPr>
+        </p:nvSpPr>
+        <p:spPr>
+          <a:xfrm>
+            <a:off x="1502988" y="3473941"/>
+            <a:ext cx="6443094" cy="585021"/>
+          </a:xfrm>
+        </p:spPr>
+        <p:txBody>
+          <a:bodyPr/>
+          <a:lstStyle/>
+          <a:p>
+            <a:pPr marL="0" indent="0">
+              <a:buNone/>
+            </a:pPr>
+            <a:r>
+              <a:rPr lang="en-US" dirty="0"/>
+              <a:t>https://</a:t>
+            </a:r>
+            <a:r>
+              <a:rPr lang="en-US" dirty="0" err="1"/>
+              <a:t>github.com</a:t>
+            </a:r>
+            <a:r>
+              <a:rPr lang="en-US" dirty="0"/>
+              <a:t>/</a:t>
+            </a:r>
+            <a:r>
+              <a:rPr lang="en-US" dirty="0" err="1"/>
+              <a:t>Kloudtek</a:t>
+            </a:r>
+            <a:r>
+              <a:rPr lang="en-US" dirty="0"/>
+              <a:t>/data-repair-center</a:t>
+            </a:r>
+          </a:p>
+          <a:p>
+            <a:endParaRPr lang="en-US" dirty="0"/>
+          </a:p>
+        </p:txBody>
+      </p:sp>
+      <p:pic>
+        <p:nvPicPr>
+          <p:cNvPr id="4" name="Picture 3" descr="search.png"/>
+          <p:cNvPicPr>
+            <a:picLocks noChangeAspect="1"/>
+          </p:cNvPicPr>
+          <p:nvPr/>
+        </p:nvPicPr>
+        <p:blipFill>
+          <a:blip r:embed="rId2">
+            <a:extLst>
+              <a:ext uri="{28A0092B-C50C-407E-A947-70E740481C1C}">
+                <a14:useLocalDpi xmlns:a14="http://schemas.microsoft.com/office/drawing/2010/main" val="0"/>
+              </a:ext>
+            </a:extLst>
+          </a:blip>
+          <a:stretch>
+            <a:fillRect/>
+          </a:stretch>
+        </p:blipFill>
+        <p:spPr>
+          <a:xfrm>
+            <a:off x="457200" y="3184384"/>
+            <a:ext cx="1045788" cy="1045788"/>
+          </a:xfrm>
+          <a:prstGeom prst="rect">
+            <a:avLst/>
+          </a:prstGeom>
+        </p:spPr>
+      </p:pic>
+    </p:spTree>
+    <p:extLst>
+      <p:ext uri="{BB962C8B-B14F-4D97-AF65-F5344CB8AC3E}">
+        <p14:creationId xmlns:p14="http://schemas.microsoft.com/office/powerpoint/2010/main" val="675809302"/>
       </p:ext>
     </p:extLst>
   </p:cSld>

</xml_diff>